<commit_message>
ps6 - facade pattern
</commit_message>
<xml_diff>
--- a/Documentation/Problem Set 6/Façade Design Pattern.pptx
+++ b/Documentation/Problem Set 6/Façade Design Pattern.pptx
@@ -10,10 +10,11 @@
     <p:sldId id="264" r:id="rId4"/>
     <p:sldId id="259" r:id="rId5"/>
     <p:sldId id="260" r:id="rId6"/>
-    <p:sldId id="261" r:id="rId7"/>
-    <p:sldId id="262" r:id="rId8"/>
-    <p:sldId id="263" r:id="rId9"/>
-    <p:sldId id="258" r:id="rId10"/>
+    <p:sldId id="265" r:id="rId7"/>
+    <p:sldId id="261" r:id="rId8"/>
+    <p:sldId id="262" r:id="rId9"/>
+    <p:sldId id="263" r:id="rId10"/>
+    <p:sldId id="258" r:id="rId11"/>
   </p:sldIdLst>
   <p:sldSz cx="9144000" cy="6858000" type="screen4x3"/>
   <p:notesSz cx="6858000" cy="9144000"/>
@@ -112,6 +113,22 @@
       </a:defRPr>
     </a:lvl9pPr>
   </p:defaultTextStyle>
+  <p:extLst>
+    <p:ext uri="{EFAFB233-063F-42B5-8137-9DF3F51BA10A}">
+      <p15:sldGuideLst xmlns:p15="http://schemas.microsoft.com/office/powerpoint/2012/main">
+        <p15:guide id="1" orient="horz" pos="2160">
+          <p15:clr>
+            <a:srgbClr val="A4A3A4"/>
+          </p15:clr>
+        </p15:guide>
+        <p15:guide id="2" pos="2880">
+          <p15:clr>
+            <a:srgbClr val="A4A3A4"/>
+          </p15:clr>
+        </p15:guide>
+      </p15:sldGuideLst>
+    </p:ext>
+  </p:extLst>
 </p:presentation>
 </file>
 
@@ -195,9 +212,7 @@
         </p:style>
         <p:txBody>
           <a:bodyPr anchor="ctr"/>
-          <a:lstStyle>
-            <a:extLst/>
-          </a:lstStyle>
+          <a:lstStyle/>
           <a:p>
             <a:pPr algn="ctr" eaLnBrk="1" latinLnBrk="0" hangingPunct="1"/>
             <a:endParaRPr kumimoji="0" lang="en-US"/>
@@ -250,10 +265,9 @@
           </a:lstStyle>
           <a:p>
             <a:r>
-              <a:rPr kumimoji="0" lang="en-US" smtClean="0"/>
+              <a:rPr kumimoji="0" lang="en-US"/>
               <a:t>Click to edit Master title style</a:t>
             </a:r>
-            <a:endParaRPr kumimoji="0" lang="en-US"/>
           </a:p>
         </p:txBody>
       </p:sp>
@@ -312,10 +326,9 @@
           </a:lstStyle>
           <a:p>
             <a:r>
-              <a:rPr kumimoji="0" lang="en-US" smtClean="0"/>
+              <a:rPr kumimoji="0" lang="en-US"/>
               <a:t>Click to edit Master subtitle style</a:t>
             </a:r>
-            <a:endParaRPr kumimoji="0" lang="en-US"/>
           </a:p>
         </p:txBody>
       </p:sp>
@@ -410,9 +423,7 @@
           </p:spPr>
           <p:txBody>
             <a:bodyPr vert="horz" wrap="square" lIns="91440" tIns="45720" rIns="91440" bIns="45720" anchor="t" compatLnSpc="1"/>
-            <a:lstStyle>
-              <a:extLst/>
-            </a:lstStyle>
+            <a:lstStyle/>
             <a:p>
               <a:endParaRPr kumimoji="0" lang="en-US"/>
             </a:p>
@@ -492,9 +503,7 @@
           </p:spPr>
           <p:txBody>
             <a:bodyPr vert="horz" wrap="square" lIns="91440" tIns="45720" rIns="91440" bIns="45720" anchor="t" compatLnSpc="1"/>
-            <a:lstStyle>
-              <a:extLst/>
-            </a:lstStyle>
+            <a:lstStyle/>
             <a:p>
               <a:endParaRPr kumimoji="0" lang="en-US"/>
             </a:p>
@@ -651,9 +660,7 @@
           </p:style>
           <p:txBody>
             <a:bodyPr vert="horz" wrap="square" lIns="91440" tIns="45720" rIns="91440" bIns="45720" anchor="ctr" compatLnSpc="1"/>
-            <a:lstStyle>
-              <a:extLst/>
-            </a:lstStyle>
+            <a:lstStyle/>
             <a:p>
               <a:pPr algn="ctr" eaLnBrk="1" latinLnBrk="0" hangingPunct="1"/>
               <a:endParaRPr kumimoji="0" lang="en-US"/>
@@ -846,15 +853,12 @@
         <p:spPr/>
         <p:txBody>
           <a:bodyPr/>
-          <a:lstStyle>
-            <a:extLst/>
-          </a:lstStyle>
-          <a:p>
-            <a:r>
-              <a:rPr kumimoji="0" lang="en-US" smtClean="0"/>
+          <a:lstStyle/>
+          <a:p>
+            <a:r>
+              <a:rPr kumimoji="0" lang="en-US"/>
               <a:t>Click to edit Master title style</a:t>
             </a:r>
-            <a:endParaRPr kumimoji="0" lang="en-US"/>
           </a:p>
         </p:txBody>
       </p:sp>
@@ -876,41 +880,39 @@
         </p:spPr>
         <p:txBody>
           <a:bodyPr vert="eaVert"/>
-          <a:lstStyle>
-            <a:extLst/>
-          </a:lstStyle>
+          <a:lstStyle/>
           <a:p>
             <a:pPr lvl="0" eaLnBrk="1" latinLnBrk="0" hangingPunct="1"/>
             <a:r>
-              <a:rPr lang="en-US" smtClean="0"/>
+              <a:rPr lang="en-US"/>
               <a:t>Click to edit Master text styles</a:t>
             </a:r>
           </a:p>
           <a:p>
             <a:pPr lvl="1" eaLnBrk="1" latinLnBrk="0" hangingPunct="1"/>
             <a:r>
-              <a:rPr lang="en-US" smtClean="0"/>
+              <a:rPr lang="en-US"/>
               <a:t>Second level</a:t>
             </a:r>
           </a:p>
           <a:p>
             <a:pPr lvl="2" eaLnBrk="1" latinLnBrk="0" hangingPunct="1"/>
             <a:r>
-              <a:rPr lang="en-US" smtClean="0"/>
+              <a:rPr lang="en-US"/>
               <a:t>Third level</a:t>
             </a:r>
           </a:p>
           <a:p>
             <a:pPr lvl="3" eaLnBrk="1" latinLnBrk="0" hangingPunct="1"/>
             <a:r>
-              <a:rPr lang="en-US" smtClean="0"/>
+              <a:rPr lang="en-US"/>
               <a:t>Fourth level</a:t>
             </a:r>
           </a:p>
           <a:p>
             <a:pPr lvl="4" eaLnBrk="1" latinLnBrk="0" hangingPunct="1"/>
             <a:r>
-              <a:rPr lang="en-US" smtClean="0"/>
+              <a:rPr lang="en-US"/>
               <a:t>Fifth level</a:t>
             </a:r>
             <a:endParaRPr kumimoji="0" lang="en-US"/>
@@ -930,9 +932,7 @@
         <p:spPr/>
         <p:txBody>
           <a:bodyPr/>
-          <a:lstStyle>
-            <a:extLst/>
-          </a:lstStyle>
+          <a:lstStyle/>
           <a:p>
             <a:fld id="{89CA732C-EC8D-4D01-9C13-B333B2C03F22}" type="datetimeFigureOut">
               <a:rPr lang="en-US" smtClean="0"/>
@@ -955,9 +955,7 @@
         <p:spPr/>
         <p:txBody>
           <a:bodyPr/>
-          <a:lstStyle>
-            <a:extLst/>
-          </a:lstStyle>
+          <a:lstStyle/>
           <a:p>
             <a:endParaRPr lang="en-US"/>
           </a:p>
@@ -976,9 +974,7 @@
         <p:spPr/>
         <p:txBody>
           <a:bodyPr/>
-          <a:lstStyle>
-            <a:extLst/>
-          </a:lstStyle>
+          <a:lstStyle/>
           <a:p>
             <a:fld id="{14AA5D45-D6C8-4760-B1EF-9690CFD47D49}" type="slidenum">
               <a:rPr lang="en-US" smtClean="0"/>
@@ -1031,15 +1027,12 @@
         </p:spPr>
         <p:txBody>
           <a:bodyPr vert="eaVert"/>
-          <a:lstStyle>
-            <a:extLst/>
-          </a:lstStyle>
-          <a:p>
-            <a:r>
-              <a:rPr kumimoji="0" lang="en-US" smtClean="0"/>
+          <a:lstStyle/>
+          <a:p>
+            <a:r>
+              <a:rPr kumimoji="0" lang="en-US"/>
               <a:t>Click to edit Master title style</a:t>
             </a:r>
-            <a:endParaRPr kumimoji="0" lang="en-US"/>
           </a:p>
         </p:txBody>
       </p:sp>
@@ -1061,41 +1054,39 @@
         </p:spPr>
         <p:txBody>
           <a:bodyPr vert="eaVert"/>
-          <a:lstStyle>
-            <a:extLst/>
-          </a:lstStyle>
+          <a:lstStyle/>
           <a:p>
             <a:pPr lvl="0" eaLnBrk="1" latinLnBrk="0" hangingPunct="1"/>
             <a:r>
-              <a:rPr lang="en-US" smtClean="0"/>
+              <a:rPr lang="en-US"/>
               <a:t>Click to edit Master text styles</a:t>
             </a:r>
           </a:p>
           <a:p>
             <a:pPr lvl="1" eaLnBrk="1" latinLnBrk="0" hangingPunct="1"/>
             <a:r>
-              <a:rPr lang="en-US" smtClean="0"/>
+              <a:rPr lang="en-US"/>
               <a:t>Second level</a:t>
             </a:r>
           </a:p>
           <a:p>
             <a:pPr lvl="2" eaLnBrk="1" latinLnBrk="0" hangingPunct="1"/>
             <a:r>
-              <a:rPr lang="en-US" smtClean="0"/>
+              <a:rPr lang="en-US"/>
               <a:t>Third level</a:t>
             </a:r>
           </a:p>
           <a:p>
             <a:pPr lvl="3" eaLnBrk="1" latinLnBrk="0" hangingPunct="1"/>
             <a:r>
-              <a:rPr lang="en-US" smtClean="0"/>
+              <a:rPr lang="en-US"/>
               <a:t>Fourth level</a:t>
             </a:r>
           </a:p>
           <a:p>
             <a:pPr lvl="4" eaLnBrk="1" latinLnBrk="0" hangingPunct="1"/>
             <a:r>
-              <a:rPr lang="en-US" smtClean="0"/>
+              <a:rPr lang="en-US"/>
               <a:t>Fifth level</a:t>
             </a:r>
             <a:endParaRPr kumimoji="0" lang="en-US"/>
@@ -1115,9 +1106,7 @@
         <p:spPr/>
         <p:txBody>
           <a:bodyPr/>
-          <a:lstStyle>
-            <a:extLst/>
-          </a:lstStyle>
+          <a:lstStyle/>
           <a:p>
             <a:fld id="{89CA732C-EC8D-4D01-9C13-B333B2C03F22}" type="datetimeFigureOut">
               <a:rPr lang="en-US" smtClean="0"/>
@@ -1140,9 +1129,7 @@
         <p:spPr/>
         <p:txBody>
           <a:bodyPr/>
-          <a:lstStyle>
-            <a:extLst/>
-          </a:lstStyle>
+          <a:lstStyle/>
           <a:p>
             <a:endParaRPr lang="en-US"/>
           </a:p>
@@ -1161,9 +1148,7 @@
         <p:spPr/>
         <p:txBody>
           <a:bodyPr/>
-          <a:lstStyle>
-            <a:extLst/>
-          </a:lstStyle>
+          <a:lstStyle/>
           <a:p>
             <a:fld id="{14AA5D45-D6C8-4760-B1EF-9690CFD47D49}" type="slidenum">
               <a:rPr lang="en-US" smtClean="0"/>
@@ -1211,41 +1196,39 @@
         <p:spPr/>
         <p:txBody>
           <a:bodyPr/>
-          <a:lstStyle>
-            <a:extLst/>
-          </a:lstStyle>
+          <a:lstStyle/>
           <a:p>
             <a:pPr lvl="0" eaLnBrk="1" latinLnBrk="0" hangingPunct="1"/>
             <a:r>
-              <a:rPr lang="en-US" smtClean="0"/>
+              <a:rPr lang="en-US"/>
               <a:t>Click to edit Master text styles</a:t>
             </a:r>
           </a:p>
           <a:p>
             <a:pPr lvl="1" eaLnBrk="1" latinLnBrk="0" hangingPunct="1"/>
             <a:r>
-              <a:rPr lang="en-US" smtClean="0"/>
+              <a:rPr lang="en-US"/>
               <a:t>Second level</a:t>
             </a:r>
           </a:p>
           <a:p>
             <a:pPr lvl="2" eaLnBrk="1" latinLnBrk="0" hangingPunct="1"/>
             <a:r>
-              <a:rPr lang="en-US" smtClean="0"/>
+              <a:rPr lang="en-US"/>
               <a:t>Third level</a:t>
             </a:r>
           </a:p>
           <a:p>
             <a:pPr lvl="3" eaLnBrk="1" latinLnBrk="0" hangingPunct="1"/>
             <a:r>
-              <a:rPr lang="en-US" smtClean="0"/>
+              <a:rPr lang="en-US"/>
               <a:t>Fourth level</a:t>
             </a:r>
           </a:p>
           <a:p>
             <a:pPr lvl="4" eaLnBrk="1" latinLnBrk="0" hangingPunct="1"/>
             <a:r>
-              <a:rPr lang="en-US" smtClean="0"/>
+              <a:rPr lang="en-US"/>
               <a:t>Fifth level</a:t>
             </a:r>
             <a:endParaRPr kumimoji="0" lang="en-US"/>
@@ -1265,9 +1248,7 @@
         <p:spPr/>
         <p:txBody>
           <a:bodyPr/>
-          <a:lstStyle>
-            <a:extLst/>
-          </a:lstStyle>
+          <a:lstStyle/>
           <a:p>
             <a:fld id="{89CA732C-EC8D-4D01-9C13-B333B2C03F22}" type="datetimeFigureOut">
               <a:rPr lang="en-US" smtClean="0"/>
@@ -1290,9 +1271,7 @@
         <p:spPr/>
         <p:txBody>
           <a:bodyPr/>
-          <a:lstStyle>
-            <a:extLst/>
-          </a:lstStyle>
+          <a:lstStyle/>
           <a:p>
             <a:endParaRPr lang="en-US"/>
           </a:p>
@@ -1311,9 +1290,7 @@
         <p:spPr/>
         <p:txBody>
           <a:bodyPr/>
-          <a:lstStyle>
-            <a:extLst/>
-          </a:lstStyle>
+          <a:lstStyle/>
           <a:p>
             <a:fld id="{14AA5D45-D6C8-4760-B1EF-9690CFD47D49}" type="slidenum">
               <a:rPr lang="en-US" smtClean="0"/>
@@ -1336,15 +1313,12 @@
         <p:spPr/>
         <p:txBody>
           <a:bodyPr rtlCol="0"/>
-          <a:lstStyle>
-            <a:extLst/>
-          </a:lstStyle>
-          <a:p>
-            <a:r>
-              <a:rPr kumimoji="0" lang="en-US" smtClean="0"/>
+          <a:lstStyle/>
+          <a:p>
+            <a:r>
+              <a:rPr kumimoji="0" lang="en-US"/>
               <a:t>Click to edit Master title style</a:t>
             </a:r>
-            <a:endParaRPr kumimoji="0" lang="en-US"/>
           </a:p>
         </p:txBody>
       </p:sp>
@@ -1422,10 +1396,9 @@
           </a:lstStyle>
           <a:p>
             <a:r>
-              <a:rPr kumimoji="0" lang="en-US" smtClean="0"/>
+              <a:rPr kumimoji="0" lang="en-US"/>
               <a:t>Click to edit Master title style</a:t>
             </a:r>
-            <a:endParaRPr kumimoji="0" lang="en-US"/>
           </a:p>
         </p:txBody>
       </p:sp>
@@ -1501,7 +1474,7 @@
           <a:p>
             <a:pPr lvl="0" eaLnBrk="1" latinLnBrk="0" hangingPunct="1"/>
             <a:r>
-              <a:rPr kumimoji="0" lang="en-US" smtClean="0"/>
+              <a:rPr kumimoji="0" lang="en-US"/>
               <a:t>Click to edit Master text styles</a:t>
             </a:r>
           </a:p>
@@ -1520,9 +1493,7 @@
         <p:spPr/>
         <p:txBody>
           <a:bodyPr/>
-          <a:lstStyle>
-            <a:extLst/>
-          </a:lstStyle>
+          <a:lstStyle/>
           <a:p>
             <a:fld id="{89CA732C-EC8D-4D01-9C13-B333B2C03F22}" type="datetimeFigureOut">
               <a:rPr lang="en-US" smtClean="0"/>
@@ -1545,9 +1516,7 @@
         <p:spPr/>
         <p:txBody>
           <a:bodyPr/>
-          <a:lstStyle>
-            <a:extLst/>
-          </a:lstStyle>
+          <a:lstStyle/>
           <a:p>
             <a:endParaRPr lang="en-US"/>
           </a:p>
@@ -1566,9 +1535,7 @@
         <p:spPr/>
         <p:txBody>
           <a:bodyPr/>
-          <a:lstStyle>
-            <a:extLst/>
-          </a:lstStyle>
+          <a:lstStyle/>
           <a:p>
             <a:fld id="{14AA5D45-D6C8-4760-B1EF-9690CFD47D49}" type="slidenum">
               <a:rPr lang="en-US" smtClean="0"/>
@@ -1649,9 +1616,7 @@
         </p:style>
         <p:txBody>
           <a:bodyPr anchor="ctr"/>
-          <a:lstStyle>
-            <a:extLst/>
-          </a:lstStyle>
+          <a:lstStyle/>
           <a:p>
             <a:pPr algn="l" eaLnBrk="1" latinLnBrk="0" hangingPunct="1"/>
             <a:endParaRPr kumimoji="0" lang="en-US"/>
@@ -1729,9 +1694,7 @@
         </p:style>
         <p:txBody>
           <a:bodyPr anchor="ctr"/>
-          <a:lstStyle>
-            <a:extLst/>
-          </a:lstStyle>
+          <a:lstStyle/>
           <a:p>
             <a:pPr algn="l" eaLnBrk="1" latinLnBrk="0" hangingPunct="1"/>
             <a:endParaRPr kumimoji="0" lang="en-US"/>
@@ -1807,35 +1770,35 @@
           <a:p>
             <a:pPr lvl="0" eaLnBrk="1" latinLnBrk="0" hangingPunct="1"/>
             <a:r>
-              <a:rPr lang="en-US" smtClean="0"/>
+              <a:rPr lang="en-US"/>
               <a:t>Click to edit Master text styles</a:t>
             </a:r>
           </a:p>
           <a:p>
             <a:pPr lvl="1" eaLnBrk="1" latinLnBrk="0" hangingPunct="1"/>
             <a:r>
-              <a:rPr lang="en-US" smtClean="0"/>
+              <a:rPr lang="en-US"/>
               <a:t>Second level</a:t>
             </a:r>
           </a:p>
           <a:p>
             <a:pPr lvl="2" eaLnBrk="1" latinLnBrk="0" hangingPunct="1"/>
             <a:r>
-              <a:rPr lang="en-US" smtClean="0"/>
+              <a:rPr lang="en-US"/>
               <a:t>Third level</a:t>
             </a:r>
           </a:p>
           <a:p>
             <a:pPr lvl="3" eaLnBrk="1" latinLnBrk="0" hangingPunct="1"/>
             <a:r>
-              <a:rPr lang="en-US" smtClean="0"/>
+              <a:rPr lang="en-US"/>
               <a:t>Fourth level</a:t>
             </a:r>
           </a:p>
           <a:p>
             <a:pPr lvl="4" eaLnBrk="1" latinLnBrk="0" hangingPunct="1"/>
             <a:r>
-              <a:rPr lang="en-US" smtClean="0"/>
+              <a:rPr lang="en-US"/>
               <a:t>Fifth level</a:t>
             </a:r>
             <a:endParaRPr kumimoji="0" lang="en-US"/>
@@ -1881,35 +1844,35 @@
           <a:p>
             <a:pPr lvl="0" eaLnBrk="1" latinLnBrk="0" hangingPunct="1"/>
             <a:r>
-              <a:rPr lang="en-US" smtClean="0"/>
+              <a:rPr lang="en-US"/>
               <a:t>Click to edit Master text styles</a:t>
             </a:r>
           </a:p>
           <a:p>
             <a:pPr lvl="1" eaLnBrk="1" latinLnBrk="0" hangingPunct="1"/>
             <a:r>
-              <a:rPr lang="en-US" smtClean="0"/>
+              <a:rPr lang="en-US"/>
               <a:t>Second level</a:t>
             </a:r>
           </a:p>
           <a:p>
             <a:pPr lvl="2" eaLnBrk="1" latinLnBrk="0" hangingPunct="1"/>
             <a:r>
-              <a:rPr lang="en-US" smtClean="0"/>
+              <a:rPr lang="en-US"/>
               <a:t>Third level</a:t>
             </a:r>
           </a:p>
           <a:p>
             <a:pPr lvl="3" eaLnBrk="1" latinLnBrk="0" hangingPunct="1"/>
             <a:r>
-              <a:rPr lang="en-US" smtClean="0"/>
+              <a:rPr lang="en-US"/>
               <a:t>Fourth level</a:t>
             </a:r>
           </a:p>
           <a:p>
             <a:pPr lvl="4" eaLnBrk="1" latinLnBrk="0" hangingPunct="1"/>
             <a:r>
-              <a:rPr lang="en-US" smtClean="0"/>
+              <a:rPr lang="en-US"/>
               <a:t>Fifth level</a:t>
             </a:r>
             <a:endParaRPr kumimoji="0" lang="en-US"/>
@@ -1929,9 +1892,7 @@
         <p:spPr/>
         <p:txBody>
           <a:bodyPr/>
-          <a:lstStyle>
-            <a:extLst/>
-          </a:lstStyle>
+          <a:lstStyle/>
           <a:p>
             <a:fld id="{89CA732C-EC8D-4D01-9C13-B333B2C03F22}" type="datetimeFigureOut">
               <a:rPr lang="en-US" smtClean="0"/>
@@ -1954,9 +1915,7 @@
         <p:spPr/>
         <p:txBody>
           <a:bodyPr/>
-          <a:lstStyle>
-            <a:extLst/>
-          </a:lstStyle>
+          <a:lstStyle/>
           <a:p>
             <a:endParaRPr lang="en-US"/>
           </a:p>
@@ -1975,9 +1934,7 @@
         <p:spPr/>
         <p:txBody>
           <a:bodyPr/>
-          <a:lstStyle>
-            <a:extLst/>
-          </a:lstStyle>
+          <a:lstStyle/>
           <a:p>
             <a:fld id="{14AA5D45-D6C8-4760-B1EF-9690CFD47D49}" type="slidenum">
               <a:rPr lang="en-US" smtClean="0"/>
@@ -2000,15 +1957,12 @@
         <p:spPr/>
         <p:txBody>
           <a:bodyPr rtlCol="0"/>
-          <a:lstStyle>
-            <a:extLst/>
-          </a:lstStyle>
-          <a:p>
-            <a:r>
-              <a:rPr kumimoji="0" lang="en-US" smtClean="0"/>
+          <a:lstStyle/>
+          <a:p>
+            <a:r>
+              <a:rPr kumimoji="0" lang="en-US"/>
               <a:t>Click to edit Master title style</a:t>
             </a:r>
-            <a:endParaRPr kumimoji="0" lang="en-US"/>
           </a:p>
         </p:txBody>
       </p:sp>
@@ -2068,10 +2022,9 @@
           </a:lstStyle>
           <a:p>
             <a:r>
-              <a:rPr kumimoji="0" lang="en-US" smtClean="0"/>
+              <a:rPr kumimoji="0" lang="en-US"/>
               <a:t>Click to edit Master title style</a:t>
             </a:r>
-            <a:endParaRPr kumimoji="0" lang="en-US"/>
           </a:p>
         </p:txBody>
       </p:sp>
@@ -2132,7 +2085,7 @@
           <a:p>
             <a:pPr lvl="0" eaLnBrk="1" latinLnBrk="0" hangingPunct="1"/>
             <a:r>
-              <a:rPr kumimoji="0" lang="en-US" smtClean="0"/>
+              <a:rPr kumimoji="0" lang="en-US"/>
               <a:t>Click to edit Master text styles</a:t>
             </a:r>
           </a:p>
@@ -2195,7 +2148,7 @@
           <a:p>
             <a:pPr lvl="0" eaLnBrk="1" latinLnBrk="0" hangingPunct="1"/>
             <a:r>
-              <a:rPr kumimoji="0" lang="en-US" smtClean="0"/>
+              <a:rPr kumimoji="0" lang="en-US"/>
               <a:t>Click to edit Master text styles</a:t>
             </a:r>
           </a:p>
@@ -2245,35 +2198,35 @@
           <a:p>
             <a:pPr lvl="0" eaLnBrk="1" latinLnBrk="0" hangingPunct="1"/>
             <a:r>
-              <a:rPr lang="en-US" smtClean="0"/>
+              <a:rPr lang="en-US"/>
               <a:t>Click to edit Master text styles</a:t>
             </a:r>
           </a:p>
           <a:p>
             <a:pPr lvl="1" eaLnBrk="1" latinLnBrk="0" hangingPunct="1"/>
             <a:r>
-              <a:rPr lang="en-US" smtClean="0"/>
+              <a:rPr lang="en-US"/>
               <a:t>Second level</a:t>
             </a:r>
           </a:p>
           <a:p>
             <a:pPr lvl="2" eaLnBrk="1" latinLnBrk="0" hangingPunct="1"/>
             <a:r>
-              <a:rPr lang="en-US" smtClean="0"/>
+              <a:rPr lang="en-US"/>
               <a:t>Third level</a:t>
             </a:r>
           </a:p>
           <a:p>
             <a:pPr lvl="3" eaLnBrk="1" latinLnBrk="0" hangingPunct="1"/>
             <a:r>
-              <a:rPr lang="en-US" smtClean="0"/>
+              <a:rPr lang="en-US"/>
               <a:t>Fourth level</a:t>
             </a:r>
           </a:p>
           <a:p>
             <a:pPr lvl="4" eaLnBrk="1" latinLnBrk="0" hangingPunct="1"/>
             <a:r>
-              <a:rPr lang="en-US" smtClean="0"/>
+              <a:rPr lang="en-US"/>
               <a:t>Fifth level</a:t>
             </a:r>
             <a:endParaRPr kumimoji="0" lang="en-US"/>
@@ -2327,35 +2280,35 @@
           <a:p>
             <a:pPr lvl="0" eaLnBrk="1" latinLnBrk="0" hangingPunct="1"/>
             <a:r>
-              <a:rPr lang="en-US" smtClean="0"/>
+              <a:rPr lang="en-US"/>
               <a:t>Click to edit Master text styles</a:t>
             </a:r>
           </a:p>
           <a:p>
             <a:pPr lvl="1" eaLnBrk="1" latinLnBrk="0" hangingPunct="1"/>
             <a:r>
-              <a:rPr lang="en-US" smtClean="0"/>
+              <a:rPr lang="en-US"/>
               <a:t>Second level</a:t>
             </a:r>
           </a:p>
           <a:p>
             <a:pPr lvl="2" eaLnBrk="1" latinLnBrk="0" hangingPunct="1"/>
             <a:r>
-              <a:rPr lang="en-US" smtClean="0"/>
+              <a:rPr lang="en-US"/>
               <a:t>Third level</a:t>
             </a:r>
           </a:p>
           <a:p>
             <a:pPr lvl="3" eaLnBrk="1" latinLnBrk="0" hangingPunct="1"/>
             <a:r>
-              <a:rPr lang="en-US" smtClean="0"/>
+              <a:rPr lang="en-US"/>
               <a:t>Fourth level</a:t>
             </a:r>
           </a:p>
           <a:p>
             <a:pPr lvl="4" eaLnBrk="1" latinLnBrk="0" hangingPunct="1"/>
             <a:r>
-              <a:rPr lang="en-US" smtClean="0"/>
+              <a:rPr lang="en-US"/>
               <a:t>Fifth level</a:t>
             </a:r>
             <a:endParaRPr kumimoji="0" lang="en-US"/>
@@ -2375,9 +2328,7 @@
         <p:spPr/>
         <p:txBody>
           <a:bodyPr/>
-          <a:lstStyle>
-            <a:extLst/>
-          </a:lstStyle>
+          <a:lstStyle/>
           <a:p>
             <a:fld id="{89CA732C-EC8D-4D01-9C13-B333B2C03F22}" type="datetimeFigureOut">
               <a:rPr lang="en-US" smtClean="0"/>
@@ -2400,9 +2351,7 @@
         <p:spPr/>
         <p:txBody>
           <a:bodyPr/>
-          <a:lstStyle>
-            <a:extLst/>
-          </a:lstStyle>
+          <a:lstStyle/>
           <a:p>
             <a:endParaRPr lang="en-US"/>
           </a:p>
@@ -2421,9 +2370,7 @@
         <p:spPr/>
         <p:txBody>
           <a:bodyPr/>
-          <a:lstStyle>
-            <a:extLst/>
-          </a:lstStyle>
+          <a:lstStyle/>
           <a:p>
             <a:fld id="{14AA5D45-D6C8-4760-B1EF-9690CFD47D49}" type="slidenum">
               <a:rPr lang="en-US" smtClean="0"/>
@@ -2476,9 +2423,7 @@
         <p:spPr/>
         <p:txBody>
           <a:bodyPr/>
-          <a:lstStyle>
-            <a:extLst/>
-          </a:lstStyle>
+          <a:lstStyle/>
           <a:p>
             <a:fld id="{89CA732C-EC8D-4D01-9C13-B333B2C03F22}" type="datetimeFigureOut">
               <a:rPr lang="en-US" smtClean="0"/>
@@ -2501,9 +2446,7 @@
         <p:spPr/>
         <p:txBody>
           <a:bodyPr/>
-          <a:lstStyle>
-            <a:extLst/>
-          </a:lstStyle>
+          <a:lstStyle/>
           <a:p>
             <a:endParaRPr lang="en-US"/>
           </a:p>
@@ -2522,9 +2465,7 @@
         <p:spPr/>
         <p:txBody>
           <a:bodyPr/>
-          <a:lstStyle>
-            <a:extLst/>
-          </a:lstStyle>
+          <a:lstStyle/>
           <a:p>
             <a:fld id="{14AA5D45-D6C8-4760-B1EF-9690CFD47D49}" type="slidenum">
               <a:rPr lang="en-US" smtClean="0"/>
@@ -2547,15 +2488,12 @@
         <p:spPr/>
         <p:txBody>
           <a:bodyPr rtlCol="0"/>
-          <a:lstStyle>
-            <a:extLst/>
-          </a:lstStyle>
-          <a:p>
-            <a:r>
-              <a:rPr kumimoji="0" lang="en-US" smtClean="0"/>
+          <a:lstStyle/>
+          <a:p>
+            <a:r>
+              <a:rPr kumimoji="0" lang="en-US"/>
               <a:t>Click to edit Master title style</a:t>
             </a:r>
-            <a:endParaRPr kumimoji="0" lang="en-US"/>
           </a:p>
         </p:txBody>
       </p:sp>
@@ -2597,9 +2535,7 @@
         <p:spPr/>
         <p:txBody>
           <a:bodyPr/>
-          <a:lstStyle>
-            <a:extLst/>
-          </a:lstStyle>
+          <a:lstStyle/>
           <a:p>
             <a:fld id="{89CA732C-EC8D-4D01-9C13-B333B2C03F22}" type="datetimeFigureOut">
               <a:rPr lang="en-US" smtClean="0"/>
@@ -2622,9 +2558,7 @@
         <p:spPr/>
         <p:txBody>
           <a:bodyPr/>
-          <a:lstStyle>
-            <a:extLst/>
-          </a:lstStyle>
+          <a:lstStyle/>
           <a:p>
             <a:endParaRPr lang="en-US"/>
           </a:p>
@@ -2643,9 +2577,7 @@
         <p:spPr/>
         <p:txBody>
           <a:bodyPr/>
-          <a:lstStyle>
-            <a:extLst/>
-          </a:lstStyle>
+          <a:lstStyle/>
           <a:p>
             <a:fld id="{14AA5D45-D6C8-4760-B1EF-9690CFD47D49}" type="slidenum">
               <a:rPr lang="en-US" smtClean="0"/>
@@ -2722,10 +2654,9 @@
           </a:lstStyle>
           <a:p>
             <a:r>
-              <a:rPr kumimoji="0" lang="en-US" smtClean="0"/>
+              <a:rPr kumimoji="0" lang="en-US"/>
               <a:t>Click to edit Master title style</a:t>
             </a:r>
-            <a:endParaRPr kumimoji="0" lang="en-US"/>
           </a:p>
         </p:txBody>
       </p:sp>
@@ -2773,7 +2704,7 @@
           <a:p>
             <a:pPr lvl="0" eaLnBrk="1" latinLnBrk="0" hangingPunct="1"/>
             <a:r>
-              <a:rPr kumimoji="0" lang="en-US" smtClean="0"/>
+              <a:rPr kumimoji="0" lang="en-US"/>
               <a:t>Click to edit Master text styles</a:t>
             </a:r>
           </a:p>
@@ -2818,35 +2749,35 @@
           <a:p>
             <a:pPr lvl="0" eaLnBrk="1" latinLnBrk="0" hangingPunct="1"/>
             <a:r>
-              <a:rPr lang="en-US" smtClean="0"/>
+              <a:rPr lang="en-US"/>
               <a:t>Click to edit Master text styles</a:t>
             </a:r>
           </a:p>
           <a:p>
             <a:pPr lvl="1" eaLnBrk="1" latinLnBrk="0" hangingPunct="1"/>
             <a:r>
-              <a:rPr lang="en-US" smtClean="0"/>
+              <a:rPr lang="en-US"/>
               <a:t>Second level</a:t>
             </a:r>
           </a:p>
           <a:p>
             <a:pPr lvl="2" eaLnBrk="1" latinLnBrk="0" hangingPunct="1"/>
             <a:r>
-              <a:rPr lang="en-US" smtClean="0"/>
+              <a:rPr lang="en-US"/>
               <a:t>Third level</a:t>
             </a:r>
           </a:p>
           <a:p>
             <a:pPr lvl="3" eaLnBrk="1" latinLnBrk="0" hangingPunct="1"/>
             <a:r>
-              <a:rPr lang="en-US" smtClean="0"/>
+              <a:rPr lang="en-US"/>
               <a:t>Fourth level</a:t>
             </a:r>
           </a:p>
           <a:p>
             <a:pPr lvl="4" eaLnBrk="1" latinLnBrk="0" hangingPunct="1"/>
             <a:r>
-              <a:rPr lang="en-US" smtClean="0"/>
+              <a:rPr lang="en-US"/>
               <a:t>Fifth level</a:t>
             </a:r>
             <a:endParaRPr kumimoji="0" lang="en-US"/>
@@ -2871,9 +2802,7 @@
         </p:spPr>
         <p:txBody>
           <a:bodyPr/>
-          <a:lstStyle>
-            <a:extLst/>
-          </a:lstStyle>
+          <a:lstStyle/>
           <a:p>
             <a:fld id="{89CA732C-EC8D-4D01-9C13-B333B2C03F22}" type="datetimeFigureOut">
               <a:rPr lang="en-US" smtClean="0"/>
@@ -2896,9 +2825,7 @@
         <p:spPr/>
         <p:txBody>
           <a:bodyPr/>
-          <a:lstStyle>
-            <a:extLst/>
-          </a:lstStyle>
+          <a:lstStyle/>
           <a:p>
             <a:endParaRPr lang="en-US"/>
           </a:p>
@@ -2917,9 +2844,7 @@
         <p:spPr/>
         <p:txBody>
           <a:bodyPr/>
-          <a:lstStyle>
-            <a:extLst/>
-          </a:lstStyle>
+          <a:lstStyle/>
           <a:p>
             <a:fld id="{14AA5D45-D6C8-4760-B1EF-9690CFD47D49}" type="slidenum">
               <a:rPr lang="en-US" smtClean="0"/>
@@ -3000,7 +2925,7 @@
           <a:p>
             <a:pPr lvl="0" eaLnBrk="1" latinLnBrk="0" hangingPunct="1"/>
             <a:r>
-              <a:rPr kumimoji="0" lang="en-US" smtClean="0"/>
+              <a:rPr kumimoji="0" lang="en-US"/>
               <a:t>Click to edit Master text styles</a:t>
             </a:r>
           </a:p>
@@ -3049,7 +2974,7 @@
           </a:lstStyle>
           <a:p>
             <a:r>
-              <a:rPr kumimoji="0" lang="en-US" smtClean="0"/>
+              <a:rPr kumimoji="0" lang="en-US"/>
               <a:t>Click icon to add picture</a:t>
             </a:r>
             <a:endParaRPr kumimoji="0" lang="en-US" dirty="0"/>
@@ -3194,10 +3119,9 @@
           </a:lstStyle>
           <a:p>
             <a:r>
-              <a:rPr kumimoji="0" lang="en-US" smtClean="0"/>
+              <a:rPr kumimoji="0" lang="en-US"/>
               <a:t>Click to edit Master title style</a:t>
             </a:r>
-            <a:endParaRPr kumimoji="0" lang="en-US"/>
           </a:p>
         </p:txBody>
       </p:sp>
@@ -3277,9 +3201,7 @@
         </p:spPr>
         <p:txBody>
           <a:bodyPr vert="horz" wrap="square" lIns="91440" tIns="45720" rIns="91440" bIns="45720" anchor="t" compatLnSpc="1"/>
-          <a:lstStyle>
-            <a:extLst/>
-          </a:lstStyle>
+          <a:lstStyle/>
           <a:p>
             <a:endParaRPr kumimoji="0" lang="en-US"/>
           </a:p>
@@ -3359,9 +3281,7 @@
         </p:spPr>
         <p:txBody>
           <a:bodyPr vert="horz" wrap="square" lIns="91440" tIns="45720" rIns="91440" bIns="45720" anchor="t" compatLnSpc="1"/>
-          <a:lstStyle>
-            <a:extLst/>
-          </a:lstStyle>
+          <a:lstStyle/>
           <a:p>
             <a:endParaRPr kumimoji="0" lang="en-US"/>
           </a:p>
@@ -3469,9 +3389,7 @@
         </p:style>
         <p:txBody>
           <a:bodyPr vert="horz" wrap="square" lIns="91440" tIns="45720" rIns="91440" bIns="45720" anchor="ctr" compatLnSpc="1"/>
-          <a:lstStyle>
-            <a:extLst/>
-          </a:lstStyle>
+          <a:lstStyle/>
           <a:p>
             <a:pPr algn="ctr" eaLnBrk="1" latinLnBrk="0" hangingPunct="1"/>
             <a:endParaRPr kumimoji="0" lang="en-US"/>
@@ -3602,9 +3520,7 @@
         </p:style>
         <p:txBody>
           <a:bodyPr anchor="ctr"/>
-          <a:lstStyle>
-            <a:extLst/>
-          </a:lstStyle>
+          <a:lstStyle/>
           <a:p>
             <a:pPr algn="l" eaLnBrk="1" latinLnBrk="0" hangingPunct="1"/>
             <a:endParaRPr kumimoji="0" lang="en-US"/>
@@ -3682,9 +3598,7 @@
         </p:style>
         <p:txBody>
           <a:bodyPr anchor="ctr"/>
-          <a:lstStyle>
-            <a:extLst/>
-          </a:lstStyle>
+          <a:lstStyle/>
           <a:p>
             <a:pPr algn="l" eaLnBrk="1" latinLnBrk="0" hangingPunct="1"/>
             <a:endParaRPr kumimoji="0" lang="en-US"/>
@@ -3797,9 +3711,7 @@
         </p:spPr>
         <p:txBody>
           <a:bodyPr vert="horz" wrap="square" lIns="91440" tIns="45720" rIns="91440" bIns="45720" anchor="t" compatLnSpc="1"/>
-          <a:lstStyle>
-            <a:extLst/>
-          </a:lstStyle>
+          <a:lstStyle/>
           <a:p>
             <a:endParaRPr kumimoji="0" lang="en-US"/>
           </a:p>
@@ -3879,9 +3791,7 @@
         </p:spPr>
         <p:txBody>
           <a:bodyPr vert="horz" wrap="square" lIns="91440" tIns="45720" rIns="91440" bIns="45720" anchor="t" compatLnSpc="1"/>
-          <a:lstStyle>
-            <a:extLst/>
-          </a:lstStyle>
+          <a:lstStyle/>
           <a:p>
             <a:endParaRPr kumimoji="0" lang="en-US"/>
           </a:p>
@@ -3989,9 +3899,7 @@
         </p:style>
         <p:txBody>
           <a:bodyPr vert="horz" wrap="square" lIns="91440" tIns="45720" rIns="91440" bIns="45720" anchor="ctr" compatLnSpc="1"/>
-          <a:lstStyle>
-            <a:extLst/>
-          </a:lstStyle>
+          <a:lstStyle/>
           <a:p>
             <a:pPr algn="ctr" eaLnBrk="1" latinLnBrk="0" hangingPunct="1"/>
             <a:endParaRPr kumimoji="0" lang="en-US"/>
@@ -4081,15 +3989,12 @@
               <a:bevelT w="25400" h="25400"/>
             </a:sp3d>
           </a:bodyPr>
-          <a:lstStyle>
-            <a:extLst/>
-          </a:lstStyle>
-          <a:p>
-            <a:r>
-              <a:rPr kumimoji="0" lang="en-US" smtClean="0"/>
+          <a:lstStyle/>
+          <a:p>
+            <a:r>
+              <a:rPr kumimoji="0" lang="en-US"/>
               <a:t>Click to edit Master title style</a:t>
             </a:r>
-            <a:endParaRPr kumimoji="0" lang="en-US"/>
           </a:p>
         </p:txBody>
       </p:sp>
@@ -4116,44 +4021,41 @@
           <a:bodyPr vert="horz">
             <a:normAutofit/>
           </a:bodyPr>
-          <a:lstStyle>
-            <a:extLst/>
-          </a:lstStyle>
+          <a:lstStyle/>
           <a:p>
             <a:pPr lvl="0" eaLnBrk="1" latinLnBrk="0" hangingPunct="1"/>
             <a:r>
-              <a:rPr kumimoji="0" lang="en-US" smtClean="0"/>
+              <a:rPr kumimoji="0" lang="en-US"/>
               <a:t>Click to edit Master text styles</a:t>
             </a:r>
           </a:p>
           <a:p>
             <a:pPr lvl="1" eaLnBrk="1" latinLnBrk="0" hangingPunct="1"/>
             <a:r>
-              <a:rPr kumimoji="0" lang="en-US" smtClean="0"/>
+              <a:rPr kumimoji="0" lang="en-US"/>
               <a:t>Second level</a:t>
             </a:r>
           </a:p>
           <a:p>
             <a:pPr lvl="2" eaLnBrk="1" latinLnBrk="0" hangingPunct="1"/>
             <a:r>
-              <a:rPr kumimoji="0" lang="en-US" smtClean="0"/>
+              <a:rPr kumimoji="0" lang="en-US"/>
               <a:t>Third level</a:t>
             </a:r>
           </a:p>
           <a:p>
             <a:pPr lvl="3" eaLnBrk="1" latinLnBrk="0" hangingPunct="1"/>
             <a:r>
-              <a:rPr kumimoji="0" lang="en-US" smtClean="0"/>
+              <a:rPr kumimoji="0" lang="en-US"/>
               <a:t>Fourth level</a:t>
             </a:r>
           </a:p>
           <a:p>
             <a:pPr lvl="4" eaLnBrk="1" latinLnBrk="0" hangingPunct="1"/>
             <a:r>
-              <a:rPr kumimoji="0" lang="en-US" smtClean="0"/>
+              <a:rPr kumimoji="0" lang="en-US"/>
               <a:t>Fifth level</a:t>
             </a:r>
-            <a:endParaRPr kumimoji="0" lang="en-US"/>
           </a:p>
         </p:txBody>
       </p:sp>
@@ -4608,110 +4510,208 @@
             <p:ph type="ctrTitle"/>
           </p:nvPr>
         </p:nvSpPr>
+        <p:spPr>
+          <a:xfrm>
+            <a:off x="695739" y="990600"/>
+            <a:ext cx="7772400" cy="1829761"/>
+          </a:xfrm>
+        </p:spPr>
+        <p:txBody>
+          <a:bodyPr/>
+          <a:lstStyle/>
+          <a:p>
+            <a:r>
+              <a:rPr lang="en-US" dirty="0"/>
+              <a:t>Facade Design Pattern</a:t>
+            </a:r>
+          </a:p>
+        </p:txBody>
+      </p:sp>
+      <p:sp>
+        <p:nvSpPr>
+          <p:cNvPr id="3" name="Subtitle 2"/>
+          <p:cNvSpPr>
+            <a:spLocks noGrp="1"/>
+          </p:cNvSpPr>
+          <p:nvPr>
+            <p:ph type="subTitle" idx="1"/>
+          </p:nvPr>
+        </p:nvSpPr>
         <p:spPr/>
         <p:txBody>
+          <a:bodyPr>
+            <a:normAutofit fontScale="47500" lnSpcReduction="20000"/>
+          </a:bodyPr>
+          <a:lstStyle/>
+          <a:p>
+            <a:r>
+              <a:rPr lang="en-US" dirty="0"/>
+              <a:t>CS5551 - Team 11</a:t>
+            </a:r>
+          </a:p>
+          <a:p>
+            <a:r>
+              <a:rPr lang="en-US" dirty="0"/>
+              <a:t>Cameron </a:t>
+            </a:r>
+            <a:r>
+              <a:rPr lang="en-US" dirty="0" err="1"/>
+              <a:t>L’Ecuyer</a:t>
+            </a:r>
+            <a:r>
+              <a:rPr lang="en-US" dirty="0"/>
+              <a:t> – Class ID: 17</a:t>
+            </a:r>
+          </a:p>
+          <a:p>
+            <a:r>
+              <a:rPr lang="en-US" dirty="0" err="1"/>
+              <a:t>Ruthvic</a:t>
+            </a:r>
+            <a:r>
+              <a:rPr lang="en-US" dirty="0"/>
+              <a:t> </a:t>
+            </a:r>
+            <a:r>
+              <a:rPr lang="en-US" dirty="0" err="1"/>
+              <a:t>Punyamurtula</a:t>
+            </a:r>
+            <a:r>
+              <a:rPr lang="en-US" dirty="0"/>
+              <a:t> – Class ID: 30</a:t>
+            </a:r>
+          </a:p>
+          <a:p>
+            <a:r>
+              <a:rPr lang="en-US" dirty="0" err="1"/>
+              <a:t>Navya</a:t>
+            </a:r>
+            <a:r>
+              <a:rPr lang="en-US" dirty="0"/>
+              <a:t> </a:t>
+            </a:r>
+            <a:r>
+              <a:rPr lang="en-US" dirty="0" err="1"/>
+              <a:t>Pillala</a:t>
+            </a:r>
+            <a:r>
+              <a:rPr lang="en-US" dirty="0"/>
+              <a:t> – Class ID: 26</a:t>
+            </a:r>
+          </a:p>
+          <a:p>
+            <a:r>
+              <a:rPr lang="en-US" dirty="0" err="1"/>
+              <a:t>Sneha</a:t>
+            </a:r>
+            <a:r>
+              <a:rPr lang="en-US" dirty="0"/>
+              <a:t> </a:t>
+            </a:r>
+            <a:r>
+              <a:rPr lang="en-US" dirty="0" err="1"/>
+              <a:t>Mishra</a:t>
+            </a:r>
+            <a:r>
+              <a:rPr lang="en-US" dirty="0"/>
+              <a:t> – Class ID: 21</a:t>
+            </a:r>
+          </a:p>
+          <a:p>
+            <a:endParaRPr lang="en-US" dirty="0"/>
+          </a:p>
+        </p:txBody>
+      </p:sp>
+    </p:spTree>
+  </p:cSld>
+  <p:clrMapOvr>
+    <a:masterClrMapping/>
+  </p:clrMapOvr>
+</p:sld>
+</file>
+
+<file path=ppt/slides/slide10.xml><?xml version="1.0" encoding="utf-8"?>
+<p:sld xmlns:a="http://schemas.openxmlformats.org/drawingml/2006/main" xmlns:r="http://schemas.openxmlformats.org/officeDocument/2006/relationships" xmlns:p="http://schemas.openxmlformats.org/presentationml/2006/main">
+  <p:cSld>
+    <p:spTree>
+      <p:nvGrpSpPr>
+        <p:cNvPr id="1" name=""/>
+        <p:cNvGrpSpPr/>
+        <p:nvPr/>
+      </p:nvGrpSpPr>
+      <p:grpSpPr>
+        <a:xfrm>
+          <a:off x="0" y="0"/>
+          <a:ext cx="0" cy="0"/>
+          <a:chOff x="0" y="0"/>
+          <a:chExt cx="0" cy="0"/>
+        </a:xfrm>
+      </p:grpSpPr>
+      <p:sp>
+        <p:nvSpPr>
+          <p:cNvPr id="2" name="Content Placeholder 1"/>
+          <p:cNvSpPr>
+            <a:spLocks noGrp="1"/>
+          </p:cNvSpPr>
+          <p:nvPr>
+            <p:ph idx="1"/>
+          </p:nvPr>
+        </p:nvSpPr>
+        <p:spPr/>
+        <p:txBody>
           <a:bodyPr/>
           <a:lstStyle/>
           <a:p>
             <a:r>
-              <a:rPr lang="en-US" dirty="0" smtClean="0"/>
-              <a:t>Façade Design Pattern</a:t>
+              <a:rPr lang="en-US" dirty="0">
+                <a:hlinkClick r:id="rId2"/>
+              </a:rPr>
+              <a:t>https://sourcemaking.com/design_patterns/facade</a:t>
             </a:r>
             <a:endParaRPr lang="en-US" dirty="0"/>
           </a:p>
-        </p:txBody>
-      </p:sp>
-      <p:sp>
-        <p:nvSpPr>
-          <p:cNvPr id="3" name="Subtitle 2"/>
-          <p:cNvSpPr>
-            <a:spLocks noGrp="1"/>
-          </p:cNvSpPr>
-          <p:nvPr>
-            <p:ph type="subTitle" idx="1"/>
+          <a:p>
+            <a:r>
+              <a:rPr lang="en-US" dirty="0">
+                <a:hlinkClick r:id="rId3"/>
+              </a:rPr>
+              <a:t>https://www.journaldev.com/1827/java-design-patterns-example-tutorial#facade-pattern</a:t>
+            </a:r>
+            <a:endParaRPr lang="en-US" dirty="0"/>
+          </a:p>
+          <a:p>
+            <a:r>
+              <a:rPr lang="en-US" dirty="0">
+                <a:hlinkClick r:id="rId4"/>
+              </a:rPr>
+              <a:t>https://www.journaldev.com/1557/facade-design-pattern-in-java</a:t>
+            </a:r>
+            <a:endParaRPr lang="en-US" dirty="0"/>
+          </a:p>
+          <a:p>
+            <a:endParaRPr lang="en-US" dirty="0"/>
+          </a:p>
+        </p:txBody>
+      </p:sp>
+      <p:sp>
+        <p:nvSpPr>
+          <p:cNvPr id="3" name="Title 2"/>
+          <p:cNvSpPr>
+            <a:spLocks noGrp="1"/>
+          </p:cNvSpPr>
+          <p:nvPr>
+            <p:ph type="title"/>
           </p:nvPr>
         </p:nvSpPr>
         <p:spPr/>
         <p:txBody>
-          <a:bodyPr>
-            <a:normAutofit fontScale="70000" lnSpcReduction="20000"/>
-          </a:bodyPr>
-          <a:lstStyle/>
-          <a:p>
-            <a:r>
-              <a:rPr lang="en-US" dirty="0" smtClean="0"/>
-              <a:t>Cameron </a:t>
-            </a:r>
-            <a:r>
-              <a:rPr lang="en-US" dirty="0" err="1" smtClean="0"/>
-              <a:t>L’Ecuyer</a:t>
-            </a:r>
-            <a:r>
-              <a:rPr lang="en-US" dirty="0" smtClean="0"/>
-              <a:t> – Class ID: </a:t>
-            </a:r>
-            <a:r>
-              <a:rPr lang="en-US" dirty="0" smtClean="0"/>
-              <a:t>17</a:t>
-            </a:r>
-            <a:endParaRPr lang="en-US" dirty="0" smtClean="0"/>
-          </a:p>
-          <a:p>
-            <a:r>
-              <a:rPr lang="en-US" dirty="0" err="1" smtClean="0"/>
-              <a:t>Ruthvic</a:t>
-            </a:r>
-            <a:r>
-              <a:rPr lang="en-US" dirty="0" smtClean="0"/>
-              <a:t> </a:t>
-            </a:r>
-            <a:r>
-              <a:rPr lang="en-US" dirty="0" err="1" smtClean="0"/>
-              <a:t>Punyamurtula</a:t>
-            </a:r>
-            <a:r>
-              <a:rPr lang="en-US" dirty="0" smtClean="0"/>
-              <a:t> – Class ID: 30</a:t>
-            </a:r>
-          </a:p>
-          <a:p>
-            <a:r>
-              <a:rPr lang="en-US" dirty="0" err="1" smtClean="0"/>
-              <a:t>Navya</a:t>
-            </a:r>
-            <a:r>
-              <a:rPr lang="en-US" dirty="0" smtClean="0"/>
-              <a:t> </a:t>
-            </a:r>
-            <a:r>
-              <a:rPr lang="en-US" dirty="0" err="1" smtClean="0"/>
-              <a:t>Pillala</a:t>
-            </a:r>
-            <a:r>
-              <a:rPr lang="en-US" dirty="0" smtClean="0"/>
-              <a:t> – Class ID: 26</a:t>
-            </a:r>
-          </a:p>
-          <a:p>
-            <a:r>
-              <a:rPr lang="en-US" dirty="0" err="1" smtClean="0"/>
-              <a:t>Sneha</a:t>
-            </a:r>
-            <a:r>
-              <a:rPr lang="en-US" dirty="0" smtClean="0"/>
-              <a:t> </a:t>
-            </a:r>
-            <a:r>
-              <a:rPr lang="en-US" dirty="0" err="1" smtClean="0"/>
-              <a:t>Mishra</a:t>
-            </a:r>
-            <a:r>
-              <a:rPr lang="en-US" dirty="0" smtClean="0"/>
-              <a:t> – Class ID: 21</a:t>
-            </a:r>
-          </a:p>
-          <a:p>
-            <a:endParaRPr lang="en-US" dirty="0"/>
+          <a:bodyPr/>
+          <a:lstStyle/>
+          <a:p>
+            <a:r>
+              <a:rPr lang="en-US" dirty="0"/>
+              <a:t>Bibliography</a:t>
+            </a:r>
           </a:p>
         </p:txBody>
       </p:sp>
@@ -4758,46 +4758,46 @@
           <a:lstStyle/>
           <a:p>
             <a:r>
-              <a:rPr lang="en-US" dirty="0" smtClean="0"/>
+              <a:rPr lang="en-US" dirty="0"/>
               <a:t>Structural Design Pattern</a:t>
             </a:r>
           </a:p>
           <a:p>
-            <a:endParaRPr lang="en-US" dirty="0" smtClean="0"/>
-          </a:p>
-          <a:p>
-            <a:r>
-              <a:rPr lang="en-US" dirty="0" smtClean="0"/>
+            <a:endParaRPr lang="en-US" dirty="0"/>
+          </a:p>
+          <a:p>
+            <a:r>
+              <a:rPr lang="en-US" dirty="0"/>
               <a:t>Used to simplify a client applications interface</a:t>
             </a:r>
           </a:p>
           <a:p>
-            <a:endParaRPr lang="en-US" dirty="0" smtClean="0"/>
-          </a:p>
-          <a:p>
-            <a:r>
-              <a:rPr lang="en-US" dirty="0" smtClean="0"/>
+            <a:endParaRPr lang="en-US" dirty="0"/>
+          </a:p>
+          <a:p>
+            <a:r>
+              <a:rPr lang="en-US" dirty="0"/>
               <a:t>Primary use is to provide a unified interface for a set of subsystems that a program may have due to increasing feature size</a:t>
             </a:r>
           </a:p>
           <a:p>
-            <a:endParaRPr lang="en-US" dirty="0" smtClean="0"/>
-          </a:p>
-          <a:p>
-            <a:r>
-              <a:rPr lang="en-US" dirty="0" smtClean="0"/>
+            <a:endParaRPr lang="en-US" dirty="0"/>
+          </a:p>
+          <a:p>
+            <a:r>
+              <a:rPr lang="en-US" dirty="0"/>
               <a:t>Acts as a wrapper for subsystems</a:t>
             </a:r>
           </a:p>
           <a:p>
-            <a:endParaRPr lang="en-US" dirty="0" smtClean="0"/>
-          </a:p>
-          <a:p>
-            <a:endParaRPr lang="en-US" dirty="0" smtClean="0"/>
-          </a:p>
-          <a:p>
             <a:endParaRPr lang="en-US" dirty="0"/>
           </a:p>
+          <a:p>
+            <a:endParaRPr lang="en-US" dirty="0"/>
+          </a:p>
+          <a:p>
+            <a:endParaRPr lang="en-US" dirty="0"/>
+          </a:p>
         </p:txBody>
       </p:sp>
       <p:sp>
@@ -4816,10 +4816,9 @@
           <a:lstStyle/>
           <a:p>
             <a:r>
-              <a:rPr lang="en-US" dirty="0" smtClean="0"/>
-              <a:t>Façade Design Pattern</a:t>
-            </a:r>
-            <a:endParaRPr lang="en-US" dirty="0"/>
+              <a:rPr lang="en-US" dirty="0"/>
+              <a:t>Facade Design Pattern</a:t>
+            </a:r>
           </a:p>
         </p:txBody>
       </p:sp>
@@ -4864,33 +4863,28 @@
           <a:lstStyle/>
           <a:p>
             <a:r>
-              <a:rPr lang="en-US" dirty="0" smtClean="0"/>
+              <a:rPr lang="en-US" dirty="0"/>
               <a:t>Subsystems should not know about it, and it should be fairly simple in nature</a:t>
             </a:r>
           </a:p>
           <a:p>
-            <a:endParaRPr lang="en-US" dirty="0" smtClean="0"/>
-          </a:p>
-          <a:p>
-            <a:r>
-              <a:rPr lang="en-US" dirty="0" smtClean="0"/>
+            <a:endParaRPr lang="en-US" dirty="0"/>
+          </a:p>
+          <a:p>
+            <a:r>
+              <a:rPr lang="en-US" dirty="0"/>
               <a:t>It is more useful as interfaces grow and become more complex, but it can be used at any time in development</a:t>
             </a:r>
           </a:p>
           <a:p>
-            <a:endParaRPr lang="en-US" dirty="0" smtClean="0"/>
-          </a:p>
-          <a:p>
-            <a:r>
-              <a:rPr lang="en-US" dirty="0" smtClean="0"/>
-              <a:t>By using Façade with the Factory Pattern, we can improve </a:t>
-            </a:r>
-            <a:r>
-              <a:rPr lang="en-US" smtClean="0"/>
-              <a:t>client-side interfaces</a:t>
-            </a:r>
             <a:endParaRPr lang="en-US" dirty="0"/>
           </a:p>
+          <a:p>
+            <a:r>
+              <a:rPr lang="en-US" dirty="0"/>
+              <a:t>By using Facade with the Factory Pattern, we can improve client-side interfaces</a:t>
+            </a:r>
+          </a:p>
         </p:txBody>
       </p:sp>
       <p:sp>
@@ -4909,14 +4903,9 @@
           <a:lstStyle/>
           <a:p>
             <a:r>
-              <a:rPr lang="en-US" dirty="0" smtClean="0"/>
-              <a:t>Façade Design </a:t>
-            </a:r>
-            <a:r>
-              <a:rPr lang="en-US" dirty="0" smtClean="0"/>
-              <a:t>Pattern (cont’d)</a:t>
-            </a:r>
-            <a:endParaRPr lang="en-US" dirty="0"/>
+              <a:rPr lang="en-US" dirty="0"/>
+              <a:t>Facade Design Pattern (cont’d)</a:t>
+            </a:r>
           </a:p>
         </p:txBody>
       </p:sp>
@@ -4961,16 +4950,15 @@
           <a:lstStyle/>
           <a:p>
             <a:r>
-              <a:rPr lang="en-US" dirty="0" smtClean="0"/>
+              <a:rPr lang="en-US" dirty="0"/>
               <a:t>Suppose you have a system composed of multiple types of databases, and you want to be able to output the data in HTML, PDF, TXT, and DOC files</a:t>
             </a:r>
           </a:p>
           <a:p>
             <a:r>
-              <a:rPr lang="en-US" dirty="0" smtClean="0"/>
-              <a:t>You can have an interface for every different database, or you can leverage the Façade Pattern to use a unified interface on top of the individual systems</a:t>
-            </a:r>
-            <a:endParaRPr lang="en-US" dirty="0"/>
+              <a:rPr lang="en-US" dirty="0"/>
+              <a:t>You can have an interface for every different database, or you can leverage the Facade Pattern to use a unified interface on top of the individual systems</a:t>
+            </a:r>
           </a:p>
         </p:txBody>
       </p:sp>
@@ -4990,10 +4978,9 @@
           <a:lstStyle/>
           <a:p>
             <a:r>
-              <a:rPr lang="en-US" dirty="0" smtClean="0"/>
-              <a:t>Use of Façade Pattern</a:t>
-            </a:r>
-            <a:endParaRPr lang="en-US" dirty="0"/>
+              <a:rPr lang="en-US" dirty="0"/>
+              <a:t>Use of Facade Pattern</a:t>
+            </a:r>
           </a:p>
         </p:txBody>
       </p:sp>
@@ -5038,10 +5025,9 @@
           <a:lstStyle/>
           <a:p>
             <a:r>
-              <a:rPr lang="en-US" dirty="0" smtClean="0"/>
+              <a:rPr lang="en-US" dirty="0"/>
               <a:t>UML</a:t>
             </a:r>
-            <a:endParaRPr lang="en-US" dirty="0"/>
           </a:p>
         </p:txBody>
       </p:sp>
@@ -5098,64 +5084,102 @@
           <a:chExt cx="0" cy="0"/>
         </a:xfrm>
       </p:grpSpPr>
-      <p:sp>
-        <p:nvSpPr>
-          <p:cNvPr id="3" name="Title 2"/>
-          <p:cNvSpPr>
-            <a:spLocks noGrp="1"/>
-          </p:cNvSpPr>
-          <p:nvPr>
-            <p:ph type="title"/>
-          </p:nvPr>
-        </p:nvSpPr>
-        <p:spPr/>
-        <p:txBody>
-          <a:bodyPr/>
-          <a:lstStyle/>
-          <a:p>
-            <a:r>
-              <a:rPr lang="en-US" dirty="0" smtClean="0"/>
-              <a:t>Code</a:t>
-            </a:r>
-            <a:endParaRPr lang="en-US" dirty="0"/>
-          </a:p>
-        </p:txBody>
-      </p:sp>
       <p:pic>
         <p:nvPicPr>
-          <p:cNvPr id="1026" name="Picture 2"/>
+          <p:cNvPr id="4" name="Content Placeholder 3">
+            <a:extLst>
+              <a:ext uri="{FF2B5EF4-FFF2-40B4-BE49-F238E27FC236}">
+                <a16:creationId xmlns:a16="http://schemas.microsoft.com/office/drawing/2014/main" id="{8EE59D15-BFCB-41CF-B82F-DD4486C00868}"/>
+              </a:ext>
+            </a:extLst>
+          </p:cNvPr>
           <p:cNvPicPr>
-            <a:picLocks noGrp="1" noChangeAspect="1" noChangeArrowheads="1"/>
+            <a:picLocks noGrp="1" noChangeAspect="1"/>
           </p:cNvPicPr>
           <p:nvPr>
             <p:ph idx="1"/>
           </p:nvPr>
         </p:nvPicPr>
         <p:blipFill>
-          <a:blip r:embed="rId2" cstate="print"/>
-          <a:srcRect/>
+          <a:blip r:embed="rId2"/>
           <a:stretch>
             <a:fillRect/>
           </a:stretch>
         </p:blipFill>
-        <p:spPr bwMode="auto">
+        <p:spPr>
           <a:xfrm>
-            <a:off x="1375877" y="1481138"/>
-            <a:ext cx="6392245" cy="4525962"/>
+            <a:off x="533401" y="1481138"/>
+            <a:ext cx="4038599" cy="4525962"/>
           </a:xfrm>
           <a:prstGeom prst="rect">
             <a:avLst/>
           </a:prstGeom>
-          <a:noFill/>
-          <a:ln w="9525">
-            <a:noFill/>
-            <a:miter lim="800000"/>
-            <a:headEnd/>
-            <a:tailEnd/>
-          </a:ln>
+        </p:spPr>
+      </p:pic>
+      <p:sp>
+        <p:nvSpPr>
+          <p:cNvPr id="3" name="Title 2">
+            <a:extLst>
+              <a:ext uri="{FF2B5EF4-FFF2-40B4-BE49-F238E27FC236}">
+                <a16:creationId xmlns:a16="http://schemas.microsoft.com/office/drawing/2014/main" id="{02901333-6438-417D-A5B0-F4C0C7C1208A}"/>
+              </a:ext>
+            </a:extLst>
+          </p:cNvPr>
+          <p:cNvSpPr>
+            <a:spLocks noGrp="1"/>
+          </p:cNvSpPr>
+          <p:nvPr>
+            <p:ph type="title"/>
+          </p:nvPr>
+        </p:nvSpPr>
+        <p:spPr/>
+        <p:txBody>
+          <a:bodyPr/>
+          <a:lstStyle/>
+          <a:p>
+            <a:r>
+              <a:rPr lang="en-US" dirty="0"/>
+              <a:t>Code - Interfaces</a:t>
+            </a:r>
+          </a:p>
+        </p:txBody>
+      </p:sp>
+      <p:pic>
+        <p:nvPicPr>
+          <p:cNvPr id="5" name="Picture 4">
+            <a:extLst>
+              <a:ext uri="{FF2B5EF4-FFF2-40B4-BE49-F238E27FC236}">
+                <a16:creationId xmlns:a16="http://schemas.microsoft.com/office/drawing/2014/main" id="{C35FD4DD-565F-4187-95F9-D9E86260BC67}"/>
+              </a:ext>
+            </a:extLst>
+          </p:cNvPr>
+          <p:cNvPicPr>
+            <a:picLocks noChangeAspect="1"/>
+          </p:cNvPicPr>
+          <p:nvPr/>
+        </p:nvPicPr>
+        <p:blipFill>
+          <a:blip r:embed="rId3"/>
+          <a:stretch>
+            <a:fillRect/>
+          </a:stretch>
+        </p:blipFill>
+        <p:spPr>
+          <a:xfrm>
+            <a:off x="4648200" y="1481139"/>
+            <a:ext cx="4164891" cy="4525962"/>
+          </a:xfrm>
+          <a:prstGeom prst="rect">
+            <a:avLst/>
+          </a:prstGeom>
         </p:spPr>
       </p:pic>
     </p:spTree>
+    <p:extLst>
+      <p:ext uri="{BB962C8B-B14F-4D97-AF65-F5344CB8AC3E}">
+        <p14:creationId xmlns:p14="http://schemas.microsoft.com/office/powerpoint/2010/main" val="3731424704"/>
+      </p:ext>
+    </p:extLst>
   </p:cSld>
   <p:clrMapOvr>
     <a:masterClrMapping/>
@@ -5196,16 +5220,15 @@
           <a:lstStyle/>
           <a:p>
             <a:r>
-              <a:rPr lang="en-US" dirty="0" smtClean="0"/>
-              <a:t>Code (cont’d)</a:t>
-            </a:r>
-            <a:endParaRPr lang="en-US" dirty="0"/>
+              <a:rPr lang="en-US" dirty="0"/>
+              <a:t>Code</a:t>
+            </a:r>
           </a:p>
         </p:txBody>
       </p:sp>
       <p:pic>
         <p:nvPicPr>
-          <p:cNvPr id="2050" name="Picture 2"/>
+          <p:cNvPr id="1026" name="Picture 2"/>
           <p:cNvPicPr>
             <a:picLocks noGrp="1" noChangeAspect="1" noChangeArrowheads="1"/>
           </p:cNvPicPr>
@@ -5222,8 +5245,8 @@
         </p:blipFill>
         <p:spPr bwMode="auto">
           <a:xfrm>
-            <a:off x="728662" y="2596356"/>
-            <a:ext cx="7686675" cy="2295525"/>
+            <a:off x="1375877" y="1481138"/>
+            <a:ext cx="6392245" cy="4525962"/>
           </a:xfrm>
           <a:prstGeom prst="rect">
             <a:avLst/>
@@ -5264,88 +5287,60 @@
       </p:grpSpPr>
       <p:sp>
         <p:nvSpPr>
-          <p:cNvPr id="2" name="Content Placeholder 1"/>
-          <p:cNvSpPr>
-            <a:spLocks noGrp="1"/>
-          </p:cNvSpPr>
+          <p:cNvPr id="3" name="Title 2"/>
+          <p:cNvSpPr>
+            <a:spLocks noGrp="1"/>
+          </p:cNvSpPr>
+          <p:nvPr>
+            <p:ph type="title"/>
+          </p:nvPr>
+        </p:nvSpPr>
+        <p:spPr/>
+        <p:txBody>
+          <a:bodyPr/>
+          <a:lstStyle/>
+          <a:p>
+            <a:r>
+              <a:rPr lang="en-US" dirty="0"/>
+              <a:t>Code (cont’d)</a:t>
+            </a:r>
+          </a:p>
+        </p:txBody>
+      </p:sp>
+      <p:pic>
+        <p:nvPicPr>
+          <p:cNvPr id="2050" name="Picture 2"/>
+          <p:cNvPicPr>
+            <a:picLocks noGrp="1" noChangeAspect="1" noChangeArrowheads="1"/>
+          </p:cNvPicPr>
           <p:nvPr>
             <p:ph idx="1"/>
           </p:nvPr>
-        </p:nvSpPr>
-        <p:spPr/>
-        <p:txBody>
-          <a:bodyPr/>
-          <a:lstStyle/>
-          <a:p>
-            <a:pPr marL="624078" indent="-514350">
-              <a:buFont typeface="+mj-lt"/>
-              <a:buAutoNum type="arabicPeriod"/>
-            </a:pPr>
-            <a:r>
-              <a:rPr lang="en-US" dirty="0" smtClean="0"/>
-              <a:t>When can you use Façade in development?</a:t>
-            </a:r>
-          </a:p>
-          <a:p>
-            <a:pPr marL="624078" indent="-514350">
-              <a:buFont typeface="+mj-lt"/>
-              <a:buAutoNum type="arabicPeriod"/>
-            </a:pPr>
-            <a:endParaRPr lang="en-US" dirty="0" smtClean="0"/>
-          </a:p>
-          <a:p>
-            <a:pPr marL="624078" indent="-514350">
-              <a:buFont typeface="+mj-lt"/>
-              <a:buAutoNum type="arabicPeriod"/>
-            </a:pPr>
-            <a:r>
-              <a:rPr lang="en-US" dirty="0" smtClean="0"/>
-              <a:t>Should subsystems know about the Façade interface?</a:t>
-            </a:r>
-          </a:p>
-          <a:p>
-            <a:pPr marL="624078" indent="-514350">
-              <a:buFont typeface="+mj-lt"/>
-              <a:buAutoNum type="arabicPeriod"/>
-            </a:pPr>
-            <a:endParaRPr lang="en-US" dirty="0" smtClean="0"/>
-          </a:p>
-          <a:p>
-            <a:pPr marL="624078" indent="-514350">
-              <a:buFont typeface="+mj-lt"/>
-              <a:buAutoNum type="arabicPeriod"/>
-            </a:pPr>
-            <a:r>
-              <a:rPr lang="en-US" dirty="0" smtClean="0"/>
-              <a:t>What pattern can it be coupled with for better client-side UI’s?</a:t>
-            </a:r>
-            <a:endParaRPr lang="en-US" dirty="0"/>
-          </a:p>
-        </p:txBody>
-      </p:sp>
-      <p:sp>
-        <p:nvSpPr>
-          <p:cNvPr id="3" name="Title 2"/>
-          <p:cNvSpPr>
-            <a:spLocks noGrp="1"/>
-          </p:cNvSpPr>
-          <p:nvPr>
-            <p:ph type="title"/>
-          </p:nvPr>
-        </p:nvSpPr>
-        <p:spPr/>
-        <p:txBody>
-          <a:bodyPr/>
-          <a:lstStyle/>
-          <a:p>
-            <a:r>
-              <a:rPr lang="en-US" dirty="0" smtClean="0"/>
-              <a:t>Questions</a:t>
-            </a:r>
-            <a:endParaRPr lang="en-US" dirty="0"/>
-          </a:p>
-        </p:txBody>
-      </p:sp>
+        </p:nvPicPr>
+        <p:blipFill>
+          <a:blip r:embed="rId2" cstate="print"/>
+          <a:srcRect/>
+          <a:stretch>
+            <a:fillRect/>
+          </a:stretch>
+        </p:blipFill>
+        <p:spPr bwMode="auto">
+          <a:xfrm>
+            <a:off x="728662" y="2596356"/>
+            <a:ext cx="7686675" cy="2295525"/>
+          </a:xfrm>
+          <a:prstGeom prst="rect">
+            <a:avLst/>
+          </a:prstGeom>
+          <a:noFill/>
+          <a:ln w="9525">
+            <a:noFill/>
+            <a:miter lim="800000"/>
+            <a:headEnd/>
+            <a:tailEnd/>
+          </a:ln>
+        </p:spPr>
+      </p:pic>
     </p:spTree>
   </p:cSld>
   <p:clrMapOvr>
@@ -5386,53 +5381,49 @@
           <a:bodyPr/>
           <a:lstStyle/>
           <a:p>
-            <a:r>
-              <a:rPr lang="en-US" dirty="0" smtClean="0">
-                <a:hlinkClick r:id="rId2"/>
-              </a:rPr>
-              <a:t>https://</a:t>
-            </a:r>
-            <a:r>
-              <a:rPr lang="en-US" dirty="0" smtClean="0">
-                <a:hlinkClick r:id="rId2"/>
-              </a:rPr>
-              <a:t>sourcemaking.com/design_patterns/facade</a:t>
-            </a:r>
-            <a:endParaRPr lang="en-US" dirty="0" smtClean="0"/>
-          </a:p>
-          <a:p>
-            <a:r>
-              <a:rPr lang="en-US" dirty="0" smtClean="0">
-                <a:hlinkClick r:id="rId3"/>
-              </a:rPr>
-              <a:t>https://</a:t>
-            </a:r>
-            <a:r>
-              <a:rPr lang="en-US" dirty="0" smtClean="0">
-                <a:hlinkClick r:id="rId3"/>
-              </a:rPr>
-              <a:t>www.journaldev.com/1827/java-design-patterns-example-tutorial#facade-pattern</a:t>
-            </a:r>
-            <a:endParaRPr lang="en-US" dirty="0" smtClean="0"/>
-          </a:p>
-          <a:p>
-            <a:r>
-              <a:rPr lang="en-US" dirty="0" smtClean="0">
-                <a:hlinkClick r:id="rId4"/>
-              </a:rPr>
-              <a:t>https://</a:t>
-            </a:r>
-            <a:r>
-              <a:rPr lang="en-US" dirty="0" smtClean="0">
-                <a:hlinkClick r:id="rId4"/>
-              </a:rPr>
-              <a:t>www.journaldev.com/1557/facade-design-pattern-in-java</a:t>
-            </a:r>
-            <a:endParaRPr lang="en-US" dirty="0" smtClean="0"/>
-          </a:p>
-          <a:p>
+            <a:pPr marL="624078" indent="-514350">
+              <a:buFont typeface="+mj-lt"/>
+              <a:buAutoNum type="arabicPeriod"/>
+            </a:pPr>
+            <a:r>
+              <a:rPr lang="en-US" dirty="0"/>
+              <a:t>When can you use Facade in development?</a:t>
+            </a:r>
+          </a:p>
+          <a:p>
+            <a:pPr marL="624078" indent="-514350">
+              <a:buFont typeface="+mj-lt"/>
+              <a:buAutoNum type="arabicPeriod"/>
+            </a:pPr>
             <a:endParaRPr lang="en-US" dirty="0"/>
           </a:p>
+          <a:p>
+            <a:pPr marL="624078" indent="-514350">
+              <a:buFont typeface="+mj-lt"/>
+              <a:buAutoNum type="arabicPeriod"/>
+            </a:pPr>
+            <a:r>
+              <a:rPr lang="en-US" dirty="0"/>
+              <a:t>Should subsystems know about the Facade interface?</a:t>
+            </a:r>
+          </a:p>
+          <a:p>
+            <a:pPr marL="624078" indent="-514350">
+              <a:buFont typeface="+mj-lt"/>
+              <a:buAutoNum type="arabicPeriod"/>
+            </a:pPr>
+            <a:endParaRPr lang="en-US" dirty="0"/>
+          </a:p>
+          <a:p>
+            <a:pPr marL="624078" indent="-514350">
+              <a:buFont typeface="+mj-lt"/>
+              <a:buAutoNum type="arabicPeriod"/>
+            </a:pPr>
+            <a:r>
+              <a:rPr lang="en-US" dirty="0"/>
+              <a:t>What pattern can it be coupled with for better client-side UI’s?</a:t>
+            </a:r>
+          </a:p>
         </p:txBody>
       </p:sp>
       <p:sp>
@@ -5451,10 +5442,9 @@
           <a:lstStyle/>
           <a:p>
             <a:r>
-              <a:rPr lang="en-US" dirty="0" smtClean="0"/>
-              <a:t>Bibliography</a:t>
-            </a:r>
-            <a:endParaRPr lang="en-US" dirty="0"/>
+              <a:rPr lang="en-US" dirty="0"/>
+              <a:t>Questions</a:t>
+            </a:r>
           </a:p>
         </p:txBody>
       </p:sp>

</xml_diff>